<commit_message>
1/8th acre req. Adam talking notes
</commit_message>
<xml_diff>
--- a/documentation/presentations/sys_eng/Systems Eng Presentation 2.pptx
+++ b/documentation/presentations/sys_eng/Systems Eng Presentation 2.pptx
@@ -978,9 +978,70 @@
               <a:buNone/>
             </a:pPr>
             <a:r>
-              <a:rPr lang="en"/>
+              <a:rPr lang="en" dirty="0"/>
               <a:t>Adam</a:t>
             </a:r>
+          </a:p>
+          <a:p>
+            <a:pPr marL="171450" lvl="0" indent="-171450">
+              <a:spcBef>
+                <a:spcPts val="0"/>
+              </a:spcBef>
+            </a:pPr>
+            <a:r>
+              <a:rPr lang="en" dirty="0"/>
+              <a:t>Removed height requirem</a:t>
+            </a:r>
+            <a:r>
+              <a:rPr lang="en-US" dirty="0" err="1"/>
+              <a:t>ent</a:t>
+            </a:r>
+            <a:endParaRPr lang="en-US" dirty="0"/>
+          </a:p>
+          <a:p>
+            <a:pPr marL="171450" lvl="0" indent="-171450">
+              <a:spcBef>
+                <a:spcPts val="0"/>
+              </a:spcBef>
+            </a:pPr>
+            <a:r>
+              <a:rPr lang="en-US" dirty="0"/>
+              <a:t>Substantially reduced coverage area</a:t>
+            </a:r>
+          </a:p>
+          <a:p>
+            <a:pPr marL="171450" lvl="0" indent="-171450">
+              <a:spcBef>
+                <a:spcPts val="0"/>
+              </a:spcBef>
+            </a:pPr>
+            <a:r>
+              <a:rPr lang="en-US" dirty="0"/>
+              <a:t>Specified object detection rate and static vs dynamic</a:t>
+            </a:r>
+          </a:p>
+          <a:p>
+            <a:pPr marL="171450" lvl="0" indent="-171450">
+              <a:spcBef>
+                <a:spcPts val="0"/>
+              </a:spcBef>
+            </a:pPr>
+            <a:r>
+              <a:rPr lang="en-US" dirty="0"/>
+              <a:t>Removed feedback</a:t>
+            </a:r>
+          </a:p>
+          <a:p>
+            <a:pPr marL="171450" lvl="0" indent="-171450">
+              <a:spcBef>
+                <a:spcPts val="0"/>
+              </a:spcBef>
+            </a:pPr>
+            <a:r>
+              <a:rPr lang="en-US" dirty="0"/>
+              <a:t>M.P.4 – A complicated way of saying we’re going to zig-zag efficiently. If you think about the task of lawn mowing, you want some overlap to ensure you’re not missing any spots. But too much overlap and you’re being inefficient. So these numbers are trying to ensure we don’t miss anything but are still being efficient.</a:t>
+            </a:r>
+            <a:endParaRPr lang="en" dirty="0"/>
           </a:p>
         </p:txBody>
       </p:sp>
@@ -1082,9 +1143,80 @@
               <a:buNone/>
             </a:pPr>
             <a:r>
-              <a:rPr lang="en"/>
+              <a:rPr lang="en" dirty="0"/>
               <a:t>Adam</a:t>
             </a:r>
+          </a:p>
+          <a:p>
+            <a:pPr marL="171450" lvl="0" indent="-171450" rtl="0">
+              <a:spcBef>
+                <a:spcPts val="0"/>
+              </a:spcBef>
+            </a:pPr>
+            <a:r>
+              <a:rPr lang="en-US" dirty="0"/>
+              <a:t>In our first attempt we approached it as </a:t>
+            </a:r>
+            <a:r>
+              <a:rPr lang="en-US" dirty="0" err="1"/>
+              <a:t>GroundsBot</a:t>
+            </a:r>
+            <a:r>
+              <a:rPr lang="en-US" dirty="0"/>
+              <a:t> the startup company. We’ve realized, while an educational experience, a lot of the NFRs we came up with weren’t relevant within the scope of the school project.</a:t>
+            </a:r>
+          </a:p>
+          <a:p>
+            <a:pPr marL="171450" lvl="0" indent="-171450" rtl="0">
+              <a:spcBef>
+                <a:spcPts val="0"/>
+              </a:spcBef>
+            </a:pPr>
+            <a:r>
+              <a:rPr lang="en-US" dirty="0"/>
+              <a:t>Pretty much all of the old ones are gone and these are the new ones.</a:t>
+            </a:r>
+          </a:p>
+          <a:p>
+            <a:pPr marL="628650" lvl="1" indent="-171450" rtl="0">
+              <a:spcBef>
+                <a:spcPts val="0"/>
+              </a:spcBef>
+            </a:pPr>
+            <a:r>
+              <a:rPr lang="en-US" dirty="0"/>
+              <a:t>Needs to be safe – don’t want to chop off limbs</a:t>
+            </a:r>
+          </a:p>
+          <a:p>
+            <a:pPr marL="628650" lvl="1" indent="-171450" rtl="0">
+              <a:spcBef>
+                <a:spcPts val="0"/>
+              </a:spcBef>
+            </a:pPr>
+            <a:r>
+              <a:rPr lang="en-US" dirty="0"/>
+              <a:t>Needs to be visible for safety as well</a:t>
+            </a:r>
+          </a:p>
+          <a:p>
+            <a:pPr marL="628650" lvl="1" indent="-171450" rtl="0">
+              <a:spcBef>
+                <a:spcPts val="0"/>
+              </a:spcBef>
+            </a:pPr>
+            <a:r>
+              <a:rPr lang="en-US"/>
+              <a:t>Needs to keep the grass in tact.</a:t>
+            </a:r>
+          </a:p>
+          <a:p>
+            <a:pPr marL="171450" lvl="0" indent="-171450" rtl="0">
+              <a:spcBef>
+                <a:spcPts val="0"/>
+              </a:spcBef>
+            </a:pPr>
+            <a:endParaRPr lang="en" dirty="0"/>
           </a:p>
         </p:txBody>
       </p:sp>
@@ -12291,7 +12423,7 @@
           <p:nvPr>
             <p:extLst>
               <p:ext uri="{D42A27DB-BD31-4B8C-83A1-F6EECF244321}">
-                <p14:modId xmlns:p14="http://schemas.microsoft.com/office/powerpoint/2010/main" val="3531328999"/>
+                <p14:modId xmlns:p14="http://schemas.microsoft.com/office/powerpoint/2010/main" val="3924649721"/>
               </p:ext>
             </p:extLst>
           </p:nvPr>
@@ -12339,7 +12471,7 @@
                         <a:buNone/>
                       </a:pPr>
                       <a:r>
-                        <a:rPr lang="en" dirty="0">
+                        <a:rPr lang="en">
                           <a:solidFill>
                             <a:schemeClr val="tx1"/>
                           </a:solidFill>
@@ -12347,6 +12479,12 @@
                         </a:rPr>
                         <a:t>ID</a:t>
                       </a:r>
+                      <a:endParaRPr lang="en" dirty="0">
+                        <a:solidFill>
+                          <a:schemeClr val="tx1"/>
+                        </a:solidFill>
+                        <a:latin typeface="Futura" panose="020B0502020202020204" pitchFamily="50" charset="0"/>
+                      </a:endParaRPr>
                     </a:p>
                   </a:txBody>
                   <a:tcPr marL="28575" marR="28575" marT="19050" marB="19050" anchor="b">
@@ -12474,7 +12612,7 @@
                         <a:buNone/>
                       </a:pPr>
                       <a:r>
-                        <a:rPr lang="en" dirty="0">
+                        <a:rPr lang="en">
                           <a:solidFill>
                             <a:schemeClr val="tx1"/>
                           </a:solidFill>
@@ -12482,6 +12620,12 @@
                         </a:rPr>
                         <a:t>M.P.1</a:t>
                       </a:r>
+                      <a:endParaRPr lang="en" dirty="0">
+                        <a:solidFill>
+                          <a:schemeClr val="tx1"/>
+                        </a:solidFill>
+                        <a:latin typeface="Futura" panose="020B0502020202020204" pitchFamily="50" charset="0"/>
+                      </a:endParaRPr>
                     </a:p>
                   </a:txBody>
                   <a:tcPr marL="28575" marR="28575" marT="19050" marB="19050">
@@ -12538,7 +12682,7 @@
                         <a:buNone/>
                       </a:pPr>
                       <a:r>
-                        <a:rPr lang="en" dirty="0">
+                        <a:rPr lang="en">
                           <a:solidFill>
                             <a:schemeClr val="tx1"/>
                           </a:solidFill>
@@ -12546,6 +12690,12 @@
                         </a:rPr>
                         <a:t>First time user inputs map within 15 minutes</a:t>
                       </a:r>
+                      <a:endParaRPr lang="en" dirty="0">
+                        <a:solidFill>
+                          <a:schemeClr val="tx1"/>
+                        </a:solidFill>
+                        <a:latin typeface="Futura" panose="020B0502020202020204" pitchFamily="50" charset="0"/>
+                      </a:endParaRPr>
                     </a:p>
                   </a:txBody>
                   <a:tcPr marL="28575" marR="28575" marT="19050" marB="19050">
@@ -12744,7 +12894,7 @@
                         <a:buNone/>
                       </a:pPr>
                       <a:r>
-                        <a:rPr lang="en" dirty="0">
+                        <a:rPr lang="en">
                           <a:solidFill>
                             <a:schemeClr val="tx1"/>
                           </a:solidFill>
@@ -12752,6 +12902,12 @@
                         </a:rPr>
                         <a:t>M.P.3</a:t>
                       </a:r>
+                      <a:endParaRPr lang="en" dirty="0">
+                        <a:solidFill>
+                          <a:schemeClr val="tx1"/>
+                        </a:solidFill>
+                        <a:latin typeface="Futura" panose="020B0502020202020204" pitchFamily="50" charset="0"/>
+                      </a:endParaRPr>
                     </a:p>
                   </a:txBody>
                   <a:tcPr marL="28575" marR="28575" marT="19050" marB="19050">
@@ -12814,8 +12970,14 @@
                           </a:solidFill>
                           <a:latin typeface="Futura" panose="020B0502020202020204" pitchFamily="50" charset="0"/>
                         </a:rPr>
-                        <a:t>Cover 1/4 acre in 30 minutes on flat, unobstructed terrain</a:t>
+                        <a:t>Cover 1/8 acre in 30 minutes on flat, unobstructed terrain</a:t>
                       </a:r>
+                      <a:endParaRPr lang="en" dirty="0">
+                        <a:solidFill>
+                          <a:schemeClr val="tx1"/>
+                        </a:solidFill>
+                        <a:latin typeface="Futura" panose="020B0502020202020204" pitchFamily="50" charset="0"/>
+                      </a:endParaRPr>
                     </a:p>
                   </a:txBody>
                   <a:tcPr marL="28575" marR="28575" marT="19050" marB="19050">
@@ -12879,7 +13041,7 @@
                         <a:buNone/>
                       </a:pPr>
                       <a:r>
-                        <a:rPr lang="en" dirty="0">
+                        <a:rPr lang="en">
                           <a:solidFill>
                             <a:schemeClr val="tx1"/>
                           </a:solidFill>
@@ -12887,6 +13049,12 @@
                         </a:rPr>
                         <a:t>M.P.4</a:t>
                       </a:r>
+                      <a:endParaRPr lang="en" dirty="0">
+                        <a:solidFill>
+                          <a:schemeClr val="tx1"/>
+                        </a:solidFill>
+                        <a:latin typeface="Futura" panose="020B0502020202020204" pitchFamily="50" charset="0"/>
+                      </a:endParaRPr>
                     </a:p>
                   </a:txBody>
                   <a:tcPr marL="28575" marR="28575" marT="19050" marB="19050">
@@ -13823,7 +13991,7 @@
         </p:nvGraphicFramePr>
         <p:xfrm>
           <a:off x="405825" y="1390500"/>
-          <a:ext cx="7939450" cy="1170778"/>
+          <a:ext cx="7939450" cy="1234975"/>
         </p:xfrm>
         <a:graphic>
           <a:graphicData uri="http://schemas.openxmlformats.org/drawingml/2006/table">

</xml_diff>

<commit_message>
FVE WBS down to 1 slide
</commit_message>
<xml_diff>
--- a/documentation/presentations/sys_eng/Systems Eng Presentation 2.pptx
+++ b/documentation/presentations/sys_eng/Systems Eng Presentation 2.pptx
@@ -6,7 +6,7 @@
     <p:sldMasterId id="2147483660" r:id="rId2"/>
   </p:sldMasterIdLst>
   <p:notesMasterIdLst>
-    <p:notesMasterId r:id="rId15"/>
+    <p:notesMasterId r:id="rId14"/>
   </p:notesMasterIdLst>
   <p:sldIdLst>
     <p:sldId id="271" r:id="rId3"/>
@@ -17,10 +17,9 @@
     <p:sldId id="261" r:id="rId8"/>
     <p:sldId id="262" r:id="rId9"/>
     <p:sldId id="263" r:id="rId10"/>
-    <p:sldId id="264" r:id="rId11"/>
-    <p:sldId id="265" r:id="rId12"/>
-    <p:sldId id="266" r:id="rId13"/>
-    <p:sldId id="268" r:id="rId14"/>
+    <p:sldId id="265" r:id="rId11"/>
+    <p:sldId id="266" r:id="rId12"/>
+    <p:sldId id="268" r:id="rId13"/>
   </p:sldIdLst>
   <p:sldSz cx="9144000" cy="5143500" type="screen16x9"/>
   <p:notesSz cx="6858000" cy="9144000"/>
@@ -716,110 +715,6 @@
 </file>
 
 <file path=ppt/notesSlides/notesSlide10.xml><?xml version="1.0" encoding="utf-8"?>
-<p:notes xmlns:a="http://schemas.openxmlformats.org/drawingml/2006/main" xmlns:r="http://schemas.openxmlformats.org/officeDocument/2006/relationships" xmlns:p="http://schemas.openxmlformats.org/presentationml/2006/main" showMasterSp="0" showMasterPhAnim="0">
-  <p:cSld>
-    <p:spTree>
-      <p:nvGrpSpPr>
-        <p:cNvPr id="1" name="Shape 114"/>
-        <p:cNvGrpSpPr/>
-        <p:nvPr/>
-      </p:nvGrpSpPr>
-      <p:grpSpPr>
-        <a:xfrm>
-          <a:off x="0" y="0"/>
-          <a:ext cx="0" cy="0"/>
-          <a:chOff x="0" y="0"/>
-          <a:chExt cx="0" cy="0"/>
-        </a:xfrm>
-      </p:grpSpPr>
-      <p:sp>
-        <p:nvSpPr>
-          <p:cNvPr id="115" name="Shape 115"/>
-          <p:cNvSpPr>
-            <a:spLocks noGrp="1" noRot="1" noChangeAspect="1"/>
-          </p:cNvSpPr>
-          <p:nvPr>
-            <p:ph type="sldImg" idx="2"/>
-          </p:nvPr>
-        </p:nvSpPr>
-        <p:spPr>
-          <a:xfrm>
-            <a:off x="381000" y="685800"/>
-            <a:ext cx="6096000" cy="3429000"/>
-          </a:xfrm>
-          <a:custGeom>
-            <a:avLst/>
-            <a:gdLst/>
-            <a:ahLst/>
-            <a:cxnLst/>
-            <a:rect l="0" t="0" r="0" b="0"/>
-            <a:pathLst>
-              <a:path w="120000" h="120000" extrusionOk="0">
-                <a:moveTo>
-                  <a:pt x="0" y="0"/>
-                </a:moveTo>
-                <a:lnTo>
-                  <a:pt x="120000" y="0"/>
-                </a:lnTo>
-                <a:lnTo>
-                  <a:pt x="120000" y="120000"/>
-                </a:lnTo>
-                <a:lnTo>
-                  <a:pt x="0" y="120000"/>
-                </a:lnTo>
-                <a:close/>
-              </a:path>
-            </a:pathLst>
-          </a:custGeom>
-        </p:spPr>
-      </p:sp>
-      <p:sp>
-        <p:nvSpPr>
-          <p:cNvPr id="116" name="Shape 116"/>
-          <p:cNvSpPr txBox="1">
-            <a:spLocks noGrp="1"/>
-          </p:cNvSpPr>
-          <p:nvPr>
-            <p:ph type="body" idx="1"/>
-          </p:nvPr>
-        </p:nvSpPr>
-        <p:spPr>
-          <a:xfrm>
-            <a:off x="685800" y="4343400"/>
-            <a:ext cx="5486400" cy="4114800"/>
-          </a:xfrm>
-          <a:prstGeom prst="rect">
-            <a:avLst/>
-          </a:prstGeom>
-        </p:spPr>
-        <p:txBody>
-          <a:bodyPr wrap="square" lIns="91425" tIns="91425" rIns="91425" bIns="91425" anchor="t" anchorCtr="0">
-            <a:noAutofit/>
-          </a:bodyPr>
-          <a:lstStyle/>
-          <a:p>
-            <a:pPr lvl="0" rtl="0">
-              <a:spcBef>
-                <a:spcPts val="0"/>
-              </a:spcBef>
-              <a:buNone/>
-            </a:pPr>
-            <a:r>
-              <a:rPr lang="en"/>
-              <a:t>Henry</a:t>
-            </a:r>
-          </a:p>
-        </p:txBody>
-      </p:sp>
-    </p:spTree>
-  </p:cSld>
-  <p:clrMapOvr>
-    <a:masterClrMapping/>
-  </p:clrMapOvr>
-</p:notes>
-</file>
-
-<file path=ppt/notesSlides/notesSlide11.xml><?xml version="1.0" encoding="utf-8"?>
 <p:notes xmlns:a="http://schemas.openxmlformats.org/drawingml/2006/main" xmlns:r="http://schemas.openxmlformats.org/officeDocument/2006/relationships" xmlns:p="http://schemas.openxmlformats.org/presentationml/2006/main">
   <p:cSld>
     <p:spTree>
@@ -1658,119 +1553,6 @@
   <p:cSld>
     <p:spTree>
       <p:nvGrpSpPr>
-        <p:cNvPr id="1" name="Shape 102"/>
-        <p:cNvGrpSpPr/>
-        <p:nvPr/>
-      </p:nvGrpSpPr>
-      <p:grpSpPr>
-        <a:xfrm>
-          <a:off x="0" y="0"/>
-          <a:ext cx="0" cy="0"/>
-          <a:chOff x="0" y="0"/>
-          <a:chExt cx="0" cy="0"/>
-        </a:xfrm>
-      </p:grpSpPr>
-      <p:sp>
-        <p:nvSpPr>
-          <p:cNvPr id="103" name="Shape 103"/>
-          <p:cNvSpPr>
-            <a:spLocks noGrp="1" noRot="1" noChangeAspect="1"/>
-          </p:cNvSpPr>
-          <p:nvPr>
-            <p:ph type="sldImg" idx="2"/>
-          </p:nvPr>
-        </p:nvSpPr>
-        <p:spPr>
-          <a:xfrm>
-            <a:off x="381000" y="685800"/>
-            <a:ext cx="6096000" cy="3429000"/>
-          </a:xfrm>
-          <a:custGeom>
-            <a:avLst/>
-            <a:gdLst/>
-            <a:ahLst/>
-            <a:cxnLst/>
-            <a:rect l="0" t="0" r="0" b="0"/>
-            <a:pathLst>
-              <a:path w="120000" h="120000" extrusionOk="0">
-                <a:moveTo>
-                  <a:pt x="0" y="0"/>
-                </a:moveTo>
-                <a:lnTo>
-                  <a:pt x="120000" y="0"/>
-                </a:lnTo>
-                <a:lnTo>
-                  <a:pt x="120000" y="120000"/>
-                </a:lnTo>
-                <a:lnTo>
-                  <a:pt x="0" y="120000"/>
-                </a:lnTo>
-                <a:close/>
-              </a:path>
-            </a:pathLst>
-          </a:custGeom>
-        </p:spPr>
-      </p:sp>
-      <p:sp>
-        <p:nvSpPr>
-          <p:cNvPr id="104" name="Shape 104"/>
-          <p:cNvSpPr txBox="1">
-            <a:spLocks noGrp="1"/>
-          </p:cNvSpPr>
-          <p:nvPr>
-            <p:ph type="body" idx="1"/>
-          </p:nvPr>
-        </p:nvSpPr>
-        <p:spPr>
-          <a:xfrm>
-            <a:off x="685800" y="4343400"/>
-            <a:ext cx="5486400" cy="4114800"/>
-          </a:xfrm>
-          <a:prstGeom prst="rect">
-            <a:avLst/>
-          </a:prstGeom>
-        </p:spPr>
-        <p:txBody>
-          <a:bodyPr wrap="square" lIns="91425" tIns="91425" rIns="91425" bIns="91425" anchor="t" anchorCtr="0">
-            <a:noAutofit/>
-          </a:bodyPr>
-          <a:lstStyle/>
-          <a:p>
-            <a:pPr lvl="0" rtl="0">
-              <a:spcBef>
-                <a:spcPts val="0"/>
-              </a:spcBef>
-              <a:buClr>
-                <a:schemeClr val="dk1"/>
-              </a:buClr>
-              <a:buSzPct val="100000"/>
-              <a:buFont typeface="Arial"/>
-              <a:buNone/>
-            </a:pPr>
-            <a:r>
-              <a:rPr lang="en">
-                <a:solidFill>
-                  <a:schemeClr val="dk1"/>
-                </a:solidFill>
-              </a:rPr>
-              <a:t>Joe</a:t>
-            </a:r>
-          </a:p>
-        </p:txBody>
-      </p:sp>
-    </p:spTree>
-  </p:cSld>
-  <p:clrMapOvr>
-    <a:masterClrMapping/>
-  </p:clrMapOvr>
-</p:notes>
-</file>
-
-<file path=ppt/notesSlides/notesSlide9.xml><?xml version="1.0" encoding="utf-8"?>
-<p:notes xmlns:a="http://schemas.openxmlformats.org/drawingml/2006/main" xmlns:r="http://schemas.openxmlformats.org/officeDocument/2006/relationships" xmlns:p="http://schemas.openxmlformats.org/presentationml/2006/main" showMasterSp="0" showMasterPhAnim="0">
-  <p:cSld>
-    <p:spTree>
-      <p:nvGrpSpPr>
         <p:cNvPr id="1" name="Shape 108"/>
         <p:cNvGrpSpPr/>
         <p:nvPr/>
@@ -1867,6 +1649,110 @@
                 </a:solidFill>
               </a:rPr>
               <a:t>Joe</a:t>
+            </a:r>
+          </a:p>
+        </p:txBody>
+      </p:sp>
+    </p:spTree>
+  </p:cSld>
+  <p:clrMapOvr>
+    <a:masterClrMapping/>
+  </p:clrMapOvr>
+</p:notes>
+</file>
+
+<file path=ppt/notesSlides/notesSlide9.xml><?xml version="1.0" encoding="utf-8"?>
+<p:notes xmlns:a="http://schemas.openxmlformats.org/drawingml/2006/main" xmlns:r="http://schemas.openxmlformats.org/officeDocument/2006/relationships" xmlns:p="http://schemas.openxmlformats.org/presentationml/2006/main" showMasterSp="0" showMasterPhAnim="0">
+  <p:cSld>
+    <p:spTree>
+      <p:nvGrpSpPr>
+        <p:cNvPr id="1" name="Shape 114"/>
+        <p:cNvGrpSpPr/>
+        <p:nvPr/>
+      </p:nvGrpSpPr>
+      <p:grpSpPr>
+        <a:xfrm>
+          <a:off x="0" y="0"/>
+          <a:ext cx="0" cy="0"/>
+          <a:chOff x="0" y="0"/>
+          <a:chExt cx="0" cy="0"/>
+        </a:xfrm>
+      </p:grpSpPr>
+      <p:sp>
+        <p:nvSpPr>
+          <p:cNvPr id="115" name="Shape 115"/>
+          <p:cNvSpPr>
+            <a:spLocks noGrp="1" noRot="1" noChangeAspect="1"/>
+          </p:cNvSpPr>
+          <p:nvPr>
+            <p:ph type="sldImg" idx="2"/>
+          </p:nvPr>
+        </p:nvSpPr>
+        <p:spPr>
+          <a:xfrm>
+            <a:off x="381000" y="685800"/>
+            <a:ext cx="6096000" cy="3429000"/>
+          </a:xfrm>
+          <a:custGeom>
+            <a:avLst/>
+            <a:gdLst/>
+            <a:ahLst/>
+            <a:cxnLst/>
+            <a:rect l="0" t="0" r="0" b="0"/>
+            <a:pathLst>
+              <a:path w="120000" h="120000" extrusionOk="0">
+                <a:moveTo>
+                  <a:pt x="0" y="0"/>
+                </a:moveTo>
+                <a:lnTo>
+                  <a:pt x="120000" y="0"/>
+                </a:lnTo>
+                <a:lnTo>
+                  <a:pt x="120000" y="120000"/>
+                </a:lnTo>
+                <a:lnTo>
+                  <a:pt x="0" y="120000"/>
+                </a:lnTo>
+                <a:close/>
+              </a:path>
+            </a:pathLst>
+          </a:custGeom>
+        </p:spPr>
+      </p:sp>
+      <p:sp>
+        <p:nvSpPr>
+          <p:cNvPr id="116" name="Shape 116"/>
+          <p:cNvSpPr txBox="1">
+            <a:spLocks noGrp="1"/>
+          </p:cNvSpPr>
+          <p:nvPr>
+            <p:ph type="body" idx="1"/>
+          </p:nvPr>
+        </p:nvSpPr>
+        <p:spPr>
+          <a:xfrm>
+            <a:off x="685800" y="4343400"/>
+            <a:ext cx="5486400" cy="4114800"/>
+          </a:xfrm>
+          <a:prstGeom prst="rect">
+            <a:avLst/>
+          </a:prstGeom>
+        </p:spPr>
+        <p:txBody>
+          <a:bodyPr wrap="square" lIns="91425" tIns="91425" rIns="91425" bIns="91425" anchor="t" anchorCtr="0">
+            <a:noAutofit/>
+          </a:bodyPr>
+          <a:lstStyle/>
+          <a:p>
+            <a:pPr lvl="0" rtl="0">
+              <a:spcBef>
+                <a:spcPts val="0"/>
+              </a:spcBef>
+              <a:buNone/>
+            </a:pPr>
+            <a:r>
+              <a:rPr lang="en"/>
+              <a:t>Henry</a:t>
             </a:r>
           </a:p>
         </p:txBody>
@@ -9862,102 +9748,6 @@
   <p:cSld>
     <p:spTree>
       <p:nvGrpSpPr>
-        <p:cNvPr id="1" name="Shape 111"/>
-        <p:cNvGrpSpPr/>
-        <p:nvPr/>
-      </p:nvGrpSpPr>
-      <p:grpSpPr>
-        <a:xfrm>
-          <a:off x="0" y="0"/>
-          <a:ext cx="0" cy="0"/>
-          <a:chOff x="0" y="0"/>
-          <a:chExt cx="0" cy="0"/>
-        </a:xfrm>
-      </p:grpSpPr>
-      <p:sp>
-        <p:nvSpPr>
-          <p:cNvPr id="112" name="Shape 112"/>
-          <p:cNvSpPr txBox="1">
-            <a:spLocks noGrp="1"/>
-          </p:cNvSpPr>
-          <p:nvPr>
-            <p:ph type="title" idx="4294967295"/>
-          </p:nvPr>
-        </p:nvSpPr>
-        <p:spPr>
-          <a:xfrm>
-            <a:off x="311700" y="216425"/>
-            <a:ext cx="8520600" cy="572700"/>
-          </a:xfrm>
-          <a:prstGeom prst="rect">
-            <a:avLst/>
-          </a:prstGeom>
-        </p:spPr>
-        <p:txBody>
-          <a:bodyPr wrap="square" lIns="91425" tIns="91425" rIns="91425" bIns="91425" anchor="t" anchorCtr="0">
-            <a:noAutofit/>
-          </a:bodyPr>
-          <a:lstStyle/>
-          <a:p>
-            <a:pPr lvl="0" rtl="0">
-              <a:spcBef>
-                <a:spcPts val="0"/>
-              </a:spcBef>
-              <a:buNone/>
-            </a:pPr>
-            <a:r>
-              <a:rPr lang="en" dirty="0">
-                <a:solidFill>
-                  <a:srgbClr val="47BD53"/>
-                </a:solidFill>
-                <a:latin typeface="Futura" panose="020B0502020202020204" pitchFamily="50" charset="0"/>
-              </a:rPr>
-              <a:t>Schedule</a:t>
-            </a:r>
-          </a:p>
-        </p:txBody>
-      </p:sp>
-      <p:pic>
-        <p:nvPicPr>
-          <p:cNvPr id="113" name="Shape 113"/>
-          <p:cNvPicPr preferRelativeResize="0"/>
-          <p:nvPr/>
-        </p:nvPicPr>
-        <p:blipFill>
-          <a:blip r:embed="rId3">
-            <a:alphaModFix/>
-          </a:blip>
-          <a:stretch>
-            <a:fillRect/>
-          </a:stretch>
-        </p:blipFill>
-        <p:spPr>
-          <a:xfrm>
-            <a:off x="2281864" y="223475"/>
-            <a:ext cx="4580274" cy="4696549"/>
-          </a:xfrm>
-          <a:prstGeom prst="rect">
-            <a:avLst/>
-          </a:prstGeom>
-          <a:noFill/>
-          <a:ln>
-            <a:noFill/>
-          </a:ln>
-        </p:spPr>
-      </p:pic>
-    </p:spTree>
-  </p:cSld>
-  <p:clrMapOvr>
-    <a:masterClrMapping/>
-  </p:clrMapOvr>
-</p:sld>
-</file>
-
-<file path=ppt/slides/slide11.xml><?xml version="1.0" encoding="utf-8"?>
-<p:sld xmlns:a="http://schemas.openxmlformats.org/drawingml/2006/main" xmlns:r="http://schemas.openxmlformats.org/officeDocument/2006/relationships" xmlns:p="http://schemas.openxmlformats.org/presentationml/2006/main">
-  <p:cSld>
-    <p:spTree>
-      <p:nvGrpSpPr>
         <p:cNvPr id="1" name="Shape 117"/>
         <p:cNvGrpSpPr/>
         <p:nvPr/>
@@ -11210,7 +11000,7 @@
 </p:sld>
 </file>
 
-<file path=ppt/slides/slide12.xml><?xml version="1.0" encoding="utf-8"?>
+<file path=ppt/slides/slide11.xml><?xml version="1.0" encoding="utf-8"?>
 <p:sld xmlns:a="http://schemas.openxmlformats.org/drawingml/2006/main" xmlns:r="http://schemas.openxmlformats.org/officeDocument/2006/relationships" xmlns:p="http://schemas.openxmlformats.org/presentationml/2006/main">
   <p:cSld>
     <p:spTree>
@@ -12430,7 +12220,7 @@
         </p:nvGraphicFramePr>
         <p:xfrm>
           <a:off x="405825" y="1326125"/>
-          <a:ext cx="7939450" cy="3137884"/>
+          <a:ext cx="7939450" cy="3330475"/>
         </p:xfrm>
         <a:graphic>
           <a:graphicData uri="http://schemas.openxmlformats.org/drawingml/2006/table">
@@ -15417,7 +15207,7 @@
         </p:nvGraphicFramePr>
         <p:xfrm>
           <a:off x="1679392" y="1359461"/>
-          <a:ext cx="5806480" cy="1119477"/>
+          <a:ext cx="5806480" cy="1130970"/>
         </p:xfrm>
         <a:graphic>
           <a:graphicData uri="http://schemas.openxmlformats.org/drawingml/2006/table">
@@ -16016,11 +15806,44 @@
                 </a:solidFill>
                 <a:latin typeface="Futura" panose="020B0502020202020204" pitchFamily="50" charset="0"/>
               </a:rPr>
-              <a:t>FVE WBS Part 1</a:t>
+              <a:t>FVE WBS</a:t>
             </a:r>
           </a:p>
         </p:txBody>
       </p:sp>
+      <p:pic>
+        <p:nvPicPr>
+          <p:cNvPr id="4" name="Shape 106" descr="fv2.png">
+            <a:extLst>
+              <a:ext uri="{FF2B5EF4-FFF2-40B4-BE49-F238E27FC236}">
+                <a16:creationId xmlns:a16="http://schemas.microsoft.com/office/drawing/2014/main" id="{D08C72DD-3497-464F-8522-3D6EDE5D9365}"/>
+              </a:ext>
+            </a:extLst>
+          </p:cNvPr>
+          <p:cNvPicPr preferRelativeResize="0"/>
+          <p:nvPr/>
+        </p:nvPicPr>
+        <p:blipFill rotWithShape="1">
+          <a:blip r:embed="rId4">
+            <a:alphaModFix/>
+          </a:blip>
+          <a:srcRect b="58330"/>
+          <a:stretch/>
+        </p:blipFill>
+        <p:spPr>
+          <a:xfrm>
+            <a:off x="1159014" y="3424488"/>
+            <a:ext cx="6825964" cy="1719012"/>
+          </a:xfrm>
+          <a:prstGeom prst="rect">
+            <a:avLst/>
+          </a:prstGeom>
+          <a:noFill/>
+          <a:ln>
+            <a:noFill/>
+          </a:ln>
+        </p:spPr>
+      </p:pic>
     </p:spTree>
   </p:cSld>
   <p:clrMapOvr>
@@ -16034,7 +15857,7 @@
   <p:cSld>
     <p:spTree>
       <p:nvGrpSpPr>
-        <p:cNvPr id="1" name="Shape 105"/>
+        <p:cNvPr id="1" name="Shape 111"/>
         <p:cNvGrpSpPr/>
         <p:nvPr/>
       </p:nvGrpSpPr>
@@ -16046,42 +15869,14 @@
           <a:chExt cx="0" cy="0"/>
         </a:xfrm>
       </p:grpSpPr>
-      <p:pic>
-        <p:nvPicPr>
-          <p:cNvPr id="106" name="Shape 106" descr="fv2.png"/>
-          <p:cNvPicPr preferRelativeResize="0"/>
-          <p:nvPr/>
-        </p:nvPicPr>
-        <p:blipFill>
-          <a:blip r:embed="rId3">
-            <a:alphaModFix/>
-          </a:blip>
-          <a:stretch>
-            <a:fillRect/>
-          </a:stretch>
-        </p:blipFill>
-        <p:spPr>
-          <a:xfrm>
-            <a:off x="1159013" y="789125"/>
-            <a:ext cx="6825964" cy="4125324"/>
-          </a:xfrm>
-          <a:prstGeom prst="rect">
-            <a:avLst/>
-          </a:prstGeom>
-          <a:noFill/>
-          <a:ln>
-            <a:noFill/>
-          </a:ln>
-        </p:spPr>
-      </p:pic>
       <p:sp>
         <p:nvSpPr>
-          <p:cNvPr id="107" name="Shape 107"/>
+          <p:cNvPr id="112" name="Shape 112"/>
           <p:cNvSpPr txBox="1">
             <a:spLocks noGrp="1"/>
           </p:cNvSpPr>
           <p:nvPr>
-            <p:ph type="title"/>
+            <p:ph type="title" idx="4294967295"/>
           </p:nvPr>
         </p:nvSpPr>
         <p:spPr>
@@ -16112,11 +15907,39 @@
                 </a:solidFill>
                 <a:latin typeface="Futura" panose="020B0502020202020204" pitchFamily="50" charset="0"/>
               </a:rPr>
-              <a:t>FVE WBS Part 2</a:t>
+              <a:t>Schedule</a:t>
             </a:r>
           </a:p>
         </p:txBody>
       </p:sp>
+      <p:pic>
+        <p:nvPicPr>
+          <p:cNvPr id="113" name="Shape 113"/>
+          <p:cNvPicPr preferRelativeResize="0"/>
+          <p:nvPr/>
+        </p:nvPicPr>
+        <p:blipFill>
+          <a:blip r:embed="rId3">
+            <a:alphaModFix/>
+          </a:blip>
+          <a:stretch>
+            <a:fillRect/>
+          </a:stretch>
+        </p:blipFill>
+        <p:spPr>
+          <a:xfrm>
+            <a:off x="2281864" y="223475"/>
+            <a:ext cx="4580274" cy="4696549"/>
+          </a:xfrm>
+          <a:prstGeom prst="rect">
+            <a:avLst/>
+          </a:prstGeom>
+          <a:noFill/>
+          <a:ln>
+            <a:noFill/>
+          </a:ln>
+        </p:spPr>
+      </p:pic>
     </p:spTree>
   </p:cSld>
   <p:clrMapOvr>

</xml_diff>